<commit_message>
Site updated: 2024-09-04 19:00:57
</commit_message>
<xml_diff>
--- a/temp.pptx
+++ b/temp.pptx
@@ -119,6 +119,59 @@
     </p:ext>
   </p:extLst>
 </p:presentation>
+</file>
+
+<file path=ppt/changesInfos/changesInfo1.xml><?xml version="1.0" encoding="utf-8"?>
+<pc:chgInfo xmlns:a="http://schemas.openxmlformats.org/drawingml/2006/main" xmlns:r="http://schemas.openxmlformats.org/officeDocument/2006/relationships" xmlns:ac="http://schemas.microsoft.com/office/drawing/2013/main/command" xmlns:pc="http://schemas.microsoft.com/office/powerpoint/2013/main/command">
+  <pc:docChgLst>
+    <pc:chgData name="Ginger 姜" userId="c023856596cfafbf" providerId="LiveId" clId="{55100307-50F8-439F-8605-F64E42D146BD}"/>
+    <pc:docChg chg="modSld modMainMaster">
+      <pc:chgData name="Ginger 姜" userId="c023856596cfafbf" providerId="LiveId" clId="{55100307-50F8-439F-8605-F64E42D146BD}" dt="2024-09-04T09:49:52.731" v="1" actId="113"/>
+      <pc:docMkLst>
+        <pc:docMk/>
+      </pc:docMkLst>
+      <pc:sldChg chg="modSp mod">
+        <pc:chgData name="Ginger 姜" userId="c023856596cfafbf" providerId="LiveId" clId="{55100307-50F8-439F-8605-F64E42D146BD}" dt="2024-09-04T09:49:33.920" v="0" actId="113"/>
+        <pc:sldMkLst>
+          <pc:docMk/>
+          <pc:sldMk cId="1116816764" sldId="256"/>
+        </pc:sldMkLst>
+        <pc:spChg chg="mod">
+          <ac:chgData name="Ginger 姜" userId="c023856596cfafbf" providerId="LiveId" clId="{55100307-50F8-439F-8605-F64E42D146BD}" dt="2024-09-04T09:49:33.920" v="0" actId="113"/>
+          <ac:spMkLst>
+            <pc:docMk/>
+            <pc:sldMk cId="1116816764" sldId="256"/>
+            <ac:spMk id="39" creationId="{DCDA0217-FA6E-2341-BD2B-C1AA7FDC5C84}"/>
+          </ac:spMkLst>
+        </pc:spChg>
+      </pc:sldChg>
+      <pc:sldMasterChg chg="modSldLayout">
+        <pc:chgData name="Ginger 姜" userId="c023856596cfafbf" providerId="LiveId" clId="{55100307-50F8-439F-8605-F64E42D146BD}" dt="2024-09-04T09:49:52.731" v="1" actId="113"/>
+        <pc:sldMasterMkLst>
+          <pc:docMk/>
+          <pc:sldMasterMk cId="3518605705" sldId="2147483648"/>
+        </pc:sldMasterMkLst>
+        <pc:sldLayoutChg chg="modSp mod">
+          <pc:chgData name="Ginger 姜" userId="c023856596cfafbf" providerId="LiveId" clId="{55100307-50F8-439F-8605-F64E42D146BD}" dt="2024-09-04T09:49:52.731" v="1" actId="113"/>
+          <pc:sldLayoutMkLst>
+            <pc:docMk/>
+            <pc:sldMasterMk cId="3518605705" sldId="2147483648"/>
+            <pc:sldLayoutMk cId="1459799580" sldId="2147483663"/>
+          </pc:sldLayoutMkLst>
+          <pc:spChg chg="mod">
+            <ac:chgData name="Ginger 姜" userId="c023856596cfafbf" providerId="LiveId" clId="{55100307-50F8-439F-8605-F64E42D146BD}" dt="2024-09-04T09:49:52.731" v="1" actId="113"/>
+            <ac:spMkLst>
+              <pc:docMk/>
+              <pc:sldMasterMk cId="3518605705" sldId="2147483648"/>
+              <pc:sldLayoutMk cId="1459799580" sldId="2147483663"/>
+              <ac:spMk id="18" creationId="{06295E2A-3E41-9B4F-A15C-7403DA4D8615}"/>
+            </ac:spMkLst>
+          </pc:spChg>
+        </pc:sldLayoutChg>
+      </pc:sldMasterChg>
+    </pc:docChg>
+  </pc:docChgLst>
+</pc:chgInfo>
 </file>
 
 <file path=ppt/diagrams/colors1.xml><?xml version="1.0" encoding="utf-8"?>
@@ -4485,7 +4538,7 @@
             </a:ln>
             <a:extLst>
               <a:ext uri="{C572A759-6A51-4108-AA02-DFA0A04FC94B}">
-                <ma14:wrappingTextBoxFlag xmlns="" xmlns:m="http://schemas.openxmlformats.org/officeDocument/2006/math" xmlns:a14="http://schemas.microsoft.com/office/drawing/2010/main" xmlns:ma14="http://schemas.microsoft.com/office/mac/drawingml/2011/main" val="1"/>
+                <ma14:wrappingTextBoxFlag xmlns:ma14="http://schemas.microsoft.com/office/mac/drawingml/2011/main" xmlns:a14="http://schemas.microsoft.com/office/drawing/2010/main" xmlns:m="http://schemas.openxmlformats.org/officeDocument/2006/math" xmlns="" val="1"/>
               </a:ext>
             </a:extLst>
           </p:spPr>
@@ -5534,7 +5587,7 @@
             </a:ln>
             <a:extLst>
               <a:ext uri="{C572A759-6A51-4108-AA02-DFA0A04FC94B}">
-                <ma14:wrappingTextBoxFlag xmlns="" xmlns:m="http://schemas.openxmlformats.org/officeDocument/2006/math" xmlns:a14="http://schemas.microsoft.com/office/drawing/2010/main" xmlns:ma14="http://schemas.microsoft.com/office/mac/drawingml/2011/main" val="1"/>
+                <ma14:wrappingTextBoxFlag xmlns:ma14="http://schemas.microsoft.com/office/mac/drawingml/2011/main" xmlns:a14="http://schemas.microsoft.com/office/drawing/2010/main" xmlns:m="http://schemas.openxmlformats.org/officeDocument/2006/math" xmlns="" val="1"/>
               </a:ext>
             </a:extLst>
           </p:spPr>
@@ -5601,14 +5654,14 @@
                 <a:t>的文本交互系</a:t>
               </a:r>
               <a:r>
-                <a:rPr lang="zh-CN" altLang="en-US" sz="2000" b="1" dirty="0">
+                <a:rPr lang="zh-CN" altLang="en-US" sz="2000" b="0" dirty="0">
                   <a:solidFill>
                     <a:schemeClr val="tx2"/>
                   </a:solidFill>
                 </a:rPr>
                 <a:t>统</a:t>
               </a:r>
-              <a:endParaRPr lang="en-US" sz="2000" b="1" spc="170" dirty="0">
+              <a:endParaRPr lang="en-US" sz="2000" b="0" spc="170" dirty="0">
                 <a:solidFill>
                   <a:schemeClr val="accent3"/>
                 </a:solidFill>
@@ -6929,7 +6982,7 @@
             </a:ln>
             <a:extLst>
               <a:ext uri="{C572A759-6A51-4108-AA02-DFA0A04FC94B}">
-                <ma14:wrappingTextBoxFlag xmlns="" xmlns:m="http://schemas.openxmlformats.org/officeDocument/2006/math" xmlns:a14="http://schemas.microsoft.com/office/drawing/2010/main" xmlns:ma14="http://schemas.microsoft.com/office/mac/drawingml/2011/main" val="1"/>
+                <ma14:wrappingTextBoxFlag xmlns:ma14="http://schemas.microsoft.com/office/mac/drawingml/2011/main" xmlns:a14="http://schemas.microsoft.com/office/drawing/2010/main" xmlns:m="http://schemas.openxmlformats.org/officeDocument/2006/math" xmlns="" val="1"/>
               </a:ext>
             </a:extLst>
           </p:spPr>
@@ -11896,7 +11949,7 @@
             </a:ln>
             <a:extLst>
               <a:ext uri="{C572A759-6A51-4108-AA02-DFA0A04FC94B}">
-                <ma14:wrappingTextBoxFlag xmlns="" xmlns:m="http://schemas.openxmlformats.org/officeDocument/2006/math" xmlns:a14="http://schemas.microsoft.com/office/drawing/2010/main" xmlns:ma14="http://schemas.microsoft.com/office/mac/drawingml/2011/main" val="1"/>
+                <ma14:wrappingTextBoxFlag xmlns:ma14="http://schemas.microsoft.com/office/mac/drawingml/2011/main" xmlns:a14="http://schemas.microsoft.com/office/drawing/2010/main" xmlns:m="http://schemas.openxmlformats.org/officeDocument/2006/math" xmlns="" val="1"/>
               </a:ext>
             </a:extLst>
           </p:spPr>
@@ -12983,7 +13036,7 @@
             </a:ln>
             <a:extLst>
               <a:ext uri="{C572A759-6A51-4108-AA02-DFA0A04FC94B}">
-                <ma14:wrappingTextBoxFlag xmlns="" xmlns:m="http://schemas.openxmlformats.org/officeDocument/2006/math" xmlns:a14="http://schemas.microsoft.com/office/drawing/2010/main" xmlns:ma14="http://schemas.microsoft.com/office/mac/drawingml/2011/main" val="1"/>
+                <ma14:wrappingTextBoxFlag xmlns:ma14="http://schemas.microsoft.com/office/mac/drawingml/2011/main" xmlns:a14="http://schemas.microsoft.com/office/drawing/2010/main" xmlns:m="http://schemas.openxmlformats.org/officeDocument/2006/math" xmlns="" val="1"/>
               </a:ext>
             </a:extLst>
           </p:spPr>
@@ -14274,7 +14327,7 @@
             </a:ln>
             <a:extLst>
               <a:ext uri="{C572A759-6A51-4108-AA02-DFA0A04FC94B}">
-                <ma14:wrappingTextBoxFlag xmlns="" xmlns:m="http://schemas.openxmlformats.org/officeDocument/2006/math" xmlns:a14="http://schemas.microsoft.com/office/drawing/2010/main" xmlns:ma14="http://schemas.microsoft.com/office/mac/drawingml/2011/main" val="1"/>
+                <ma14:wrappingTextBoxFlag xmlns:ma14="http://schemas.microsoft.com/office/mac/drawingml/2011/main" xmlns:a14="http://schemas.microsoft.com/office/drawing/2010/main" xmlns:m="http://schemas.openxmlformats.org/officeDocument/2006/math" xmlns="" val="1"/>
               </a:ext>
             </a:extLst>
           </p:spPr>
@@ -15409,7 +15462,7 @@
             </a:ln>
             <a:extLst>
               <a:ext uri="{C572A759-6A51-4108-AA02-DFA0A04FC94B}">
-                <ma14:wrappingTextBoxFlag xmlns="" xmlns:m="http://schemas.openxmlformats.org/officeDocument/2006/math" xmlns:a14="http://schemas.microsoft.com/office/drawing/2010/main" xmlns:ma14="http://schemas.microsoft.com/office/mac/drawingml/2011/main" val="1"/>
+                <ma14:wrappingTextBoxFlag xmlns:ma14="http://schemas.microsoft.com/office/mac/drawingml/2011/main" xmlns:a14="http://schemas.microsoft.com/office/drawing/2010/main" xmlns:m="http://schemas.openxmlformats.org/officeDocument/2006/math" xmlns="" val="1"/>
               </a:ext>
             </a:extLst>
           </p:spPr>
@@ -17071,7 +17124,7 @@
           </a:ln>
           <a:extLst>
             <a:ext uri="{C572A759-6A51-4108-AA02-DFA0A04FC94B}">
-              <ma14:wrappingTextBoxFlag xmlns="" xmlns:m="http://schemas.openxmlformats.org/officeDocument/2006/math" xmlns:a14="http://schemas.microsoft.com/office/drawing/2010/main" xmlns:ma14="http://schemas.microsoft.com/office/mac/drawingml/2011/main" val="1"/>
+              <ma14:wrappingTextBoxFlag xmlns:ma14="http://schemas.microsoft.com/office/mac/drawingml/2011/main" xmlns:a14="http://schemas.microsoft.com/office/drawing/2010/main" xmlns:m="http://schemas.openxmlformats.org/officeDocument/2006/math" xmlns="" val="1"/>
             </a:ext>
           </a:extLst>
         </p:spPr>
@@ -19904,7 +19957,7 @@
           </a:ln>
           <a:extLst>
             <a:ext uri="{C572A759-6A51-4108-AA02-DFA0A04FC94B}">
-              <ma14:wrappingTextBoxFlag xmlns="" xmlns:m="http://schemas.openxmlformats.org/officeDocument/2006/math" xmlns:a14="http://schemas.microsoft.com/office/drawing/2010/main" xmlns:ma14="http://schemas.microsoft.com/office/mac/drawingml/2011/main" val="1"/>
+              <ma14:wrappingTextBoxFlag xmlns:ma14="http://schemas.microsoft.com/office/mac/drawingml/2011/main" xmlns:a14="http://schemas.microsoft.com/office/drawing/2010/main" xmlns:m="http://schemas.openxmlformats.org/officeDocument/2006/math" xmlns="" val="1"/>
             </a:ext>
           </a:extLst>
         </p:spPr>
@@ -19958,17 +20011,9 @@
                   <a:schemeClr val="bg1"/>
                 </a:solidFill>
               </a:rPr>
-              <a:t>的文本交互系</a:t>
+              <a:t>的文本交互系统</a:t>
             </a:r>
-            <a:r>
-              <a:rPr lang="zh-CN" altLang="en-US" sz="6600" b="1" dirty="0">
-                <a:solidFill>
-                  <a:schemeClr val="bg1"/>
-                </a:solidFill>
-              </a:rPr>
-              <a:t>统</a:t>
-            </a:r>
-            <a:endParaRPr sz="6600" b="1" spc="170" dirty="0">
+            <a:endParaRPr sz="6600" spc="170" dirty="0">
               <a:solidFill>
                 <a:schemeClr val="bg1"/>
               </a:solidFill>

</xml_diff>